<commit_message>
Update [CTF 解题报告] Flash - Authentication.pptx
</commit_message>
<xml_diff>
--- a/rootme/Web-Client/[11] [40P] Flash - Authentication/[CTF 解题报告] Flash - Authentication.pptx
+++ b/rootme/Web-Client/[11] [40P] Flash - Authentication/[CTF 解题报告] Flash - Authentication.pptx
@@ -224,7 +224,7 @@
             <a:fld id="{ED62F5BD-5648-4223-8D90-D5276EA4D7E0}" type="datetimeFigureOut">
               <a:rPr lang="zh-CN" altLang="en-US" smtClean="0"/>
               <a:pPr/>
-              <a:t>2019/4/27</a:t>
+              <a:t>2019/4/29</a:t>
             </a:fld>
             <a:endParaRPr lang="zh-CN" altLang="en-US"/>
           </a:p>
@@ -1688,7 +1688,7 @@
             <a:fld id="{BB12B589-21DE-46A2-AF91-CC043ECE94FC}" type="datetimeFigureOut">
               <a:rPr lang="zh-CN" altLang="en-US" smtClean="0"/>
               <a:pPr/>
-              <a:t>2019/4/27</a:t>
+              <a:t>2019/4/29</a:t>
             </a:fld>
             <a:endParaRPr lang="zh-CN" altLang="en-US"/>
           </a:p>
@@ -1858,7 +1858,7 @@
             <a:fld id="{BB12B589-21DE-46A2-AF91-CC043ECE94FC}" type="datetimeFigureOut">
               <a:rPr lang="zh-CN" altLang="en-US" smtClean="0"/>
               <a:pPr/>
-              <a:t>2019/4/27</a:t>
+              <a:t>2019/4/29</a:t>
             </a:fld>
             <a:endParaRPr lang="zh-CN" altLang="en-US"/>
           </a:p>
@@ -2038,7 +2038,7 @@
             <a:fld id="{BB12B589-21DE-46A2-AF91-CC043ECE94FC}" type="datetimeFigureOut">
               <a:rPr lang="zh-CN" altLang="en-US" smtClean="0"/>
               <a:pPr/>
-              <a:t>2019/4/27</a:t>
+              <a:t>2019/4/29</a:t>
             </a:fld>
             <a:endParaRPr lang="zh-CN" altLang="en-US"/>
           </a:p>
@@ -2208,7 +2208,7 @@
             <a:fld id="{BB12B589-21DE-46A2-AF91-CC043ECE94FC}" type="datetimeFigureOut">
               <a:rPr lang="zh-CN" altLang="en-US" smtClean="0"/>
               <a:pPr/>
-              <a:t>2019/4/27</a:t>
+              <a:t>2019/4/29</a:t>
             </a:fld>
             <a:endParaRPr lang="zh-CN" altLang="en-US"/>
           </a:p>
@@ -2455,7 +2455,7 @@
             <a:fld id="{BB12B589-21DE-46A2-AF91-CC043ECE94FC}" type="datetimeFigureOut">
               <a:rPr lang="zh-CN" altLang="en-US" smtClean="0"/>
               <a:pPr/>
-              <a:t>2019/4/27</a:t>
+              <a:t>2019/4/29</a:t>
             </a:fld>
             <a:endParaRPr lang="zh-CN" altLang="en-US"/>
           </a:p>
@@ -2686,7 +2686,7 @@
             <a:fld id="{BB12B589-21DE-46A2-AF91-CC043ECE94FC}" type="datetimeFigureOut">
               <a:rPr lang="zh-CN" altLang="en-US" smtClean="0"/>
               <a:pPr/>
-              <a:t>2019/4/27</a:t>
+              <a:t>2019/4/29</a:t>
             </a:fld>
             <a:endParaRPr lang="zh-CN" altLang="en-US"/>
           </a:p>
@@ -3052,7 +3052,7 @@
             <a:fld id="{BB12B589-21DE-46A2-AF91-CC043ECE94FC}" type="datetimeFigureOut">
               <a:rPr lang="zh-CN" altLang="en-US" smtClean="0"/>
               <a:pPr/>
-              <a:t>2019/4/27</a:t>
+              <a:t>2019/4/29</a:t>
             </a:fld>
             <a:endParaRPr lang="zh-CN" altLang="en-US"/>
           </a:p>
@@ -3171,7 +3171,7 @@
             <a:fld id="{BB12B589-21DE-46A2-AF91-CC043ECE94FC}" type="datetimeFigureOut">
               <a:rPr lang="zh-CN" altLang="en-US" smtClean="0"/>
               <a:pPr/>
-              <a:t>2019/4/27</a:t>
+              <a:t>2019/4/29</a:t>
             </a:fld>
             <a:endParaRPr lang="zh-CN" altLang="en-US"/>
           </a:p>
@@ -3268,7 +3268,7 @@
             <a:fld id="{BB12B589-21DE-46A2-AF91-CC043ECE94FC}" type="datetimeFigureOut">
               <a:rPr lang="zh-CN" altLang="en-US" smtClean="0"/>
               <a:pPr/>
-              <a:t>2019/4/27</a:t>
+              <a:t>2019/4/29</a:t>
             </a:fld>
             <a:endParaRPr lang="zh-CN" altLang="en-US"/>
           </a:p>
@@ -3545,7 +3545,7 @@
             <a:fld id="{BB12B589-21DE-46A2-AF91-CC043ECE94FC}" type="datetimeFigureOut">
               <a:rPr lang="zh-CN" altLang="en-US" smtClean="0"/>
               <a:pPr/>
-              <a:t>2019/4/27</a:t>
+              <a:t>2019/4/29</a:t>
             </a:fld>
             <a:endParaRPr lang="zh-CN" altLang="en-US"/>
           </a:p>
@@ -3799,7 +3799,7 @@
             <a:fld id="{BB12B589-21DE-46A2-AF91-CC043ECE94FC}" type="datetimeFigureOut">
               <a:rPr lang="zh-CN" altLang="en-US" smtClean="0"/>
               <a:pPr/>
-              <a:t>2019/4/27</a:t>
+              <a:t>2019/4/29</a:t>
             </a:fld>
             <a:endParaRPr lang="zh-CN" altLang="en-US"/>
           </a:p>
@@ -4021,7 +4021,7 @@
             <a:fld id="{BB12B589-21DE-46A2-AF91-CC043ECE94FC}" type="datetimeFigureOut">
               <a:rPr lang="zh-CN" altLang="en-US" smtClean="0"/>
               <a:pPr/>
-              <a:t>2019/4/27</a:t>
+              <a:t>2019/4/29</a:t>
             </a:fld>
             <a:endParaRPr lang="zh-CN" altLang="en-US"/>
           </a:p>
@@ -6486,8 +6486,28 @@
                   <a:schemeClr val="bg1"/>
                 </a:solidFill>
               </a:rPr>
-              <a:t>                                   👉 加密原理 </a:t>
-            </a:r>
+              <a:t>                                   👉 </a:t>
+            </a:r>
+            <a:r>
+              <a:rPr lang="zh-CN" altLang="en-US" dirty="0">
+                <a:solidFill>
+                  <a:schemeClr val="bg1"/>
+                </a:solidFill>
+                <a:hlinkClick r:id="rId6">
+                  <a:extLst>
+                    <a:ext uri="{A12FA001-AC4F-418D-AE19-62706E023703}">
+                      <ahyp:hlinkClr xmlns:ahyp="http://schemas.microsoft.com/office/drawing/2018/hyperlinkcolor" val="tx"/>
+                    </a:ext>
+                  </a:extLst>
+                </a:hlinkClick>
+              </a:rPr>
+              <a:t>加密原理 </a:t>
+            </a:r>
+            <a:endParaRPr lang="zh-CN" altLang="en-US" dirty="0">
+              <a:solidFill>
+                <a:schemeClr val="bg1"/>
+              </a:solidFill>
+            </a:endParaRPr>
           </a:p>
         </p:txBody>
       </p:sp>
@@ -7169,8 +7189,8 @@
         </p:nvSpPr>
         <p:spPr>
           <a:xfrm>
-            <a:off x="8641429" y="1029059"/>
-            <a:ext cx="1869616" cy="584775"/>
+            <a:off x="8641429" y="1203717"/>
+            <a:ext cx="1869616" cy="369332"/>
           </a:xfrm>
           <a:prstGeom prst="rect">
             <a:avLst/>
@@ -7185,16 +7205,10 @@
           <a:p>
             <a:pPr algn="ctr"/>
             <a:r>
-              <a:rPr lang="en-US" altLang="zh-CN" sz="3200" dirty="0">
-                <a:latin typeface="Aldhabi" panose="01000000000000000000" pitchFamily="2" charset="-78"/>
-                <a:cs typeface="Aldhabi" panose="01000000000000000000" pitchFamily="2" charset="-78"/>
-              </a:rPr>
+              <a:rPr lang="en-US" altLang="zh-CN" dirty="0"/>
               <a:t>Catalogue</a:t>
             </a:r>
-            <a:endParaRPr lang="zh-CN" altLang="en-US" sz="3200" dirty="0">
-              <a:latin typeface="Aldhabi" panose="01000000000000000000" pitchFamily="2" charset="-78"/>
-              <a:cs typeface="Aldhabi" panose="01000000000000000000" pitchFamily="2" charset="-78"/>
-            </a:endParaRPr>
+            <a:endParaRPr lang="zh-CN" altLang="en-US" dirty="0"/>
           </a:p>
         </p:txBody>
       </p:sp>

</xml_diff>